<commit_message>
updating slides for pp day
</commit_message>
<xml_diff>
--- a/ClassMaterials/PairProgrammingAndSourceControl/Part3-CodeReviewGuidelines.pptx
+++ b/ClassMaterials/PairProgrammingAndSourceControl/Part3-CodeReviewGuidelines.pptx
@@ -148,6 +148,83 @@
 </p:cmAuthorLst>
 </file>
 
+<file path=ppt/changesInfos/changesInfo1.xml><?xml version="1.0" encoding="utf-8"?>
+<pc:chgInfo xmlns:a="http://schemas.openxmlformats.org/drawingml/2006/main" xmlns:r="http://schemas.openxmlformats.org/officeDocument/2006/relationships" xmlns:ac="http://schemas.microsoft.com/office/drawing/2013/main/command" xmlns:pc="http://schemas.microsoft.com/office/powerpoint/2013/main/command">
+  <pc:docChgLst>
+    <pc:chgData name="Yoder, Jason" userId="28f4d4d8-da04-4f86-b14d-a21675737bc5" providerId="ADAL" clId="{D38472CA-A2F5-472B-9D5F-A440450DF1E1}"/>
+    <pc:docChg chg="custSel modSld">
+      <pc:chgData name="Yoder, Jason" userId="28f4d4d8-da04-4f86-b14d-a21675737bc5" providerId="ADAL" clId="{D38472CA-A2F5-472B-9D5F-A440450DF1E1}" dt="2023-10-22T22:36:43.025" v="25" actId="1076"/>
+      <pc:docMkLst>
+        <pc:docMk/>
+      </pc:docMkLst>
+      <pc:sldChg chg="addSp delSp modSp mod">
+        <pc:chgData name="Yoder, Jason" userId="28f4d4d8-da04-4f86-b14d-a21675737bc5" providerId="ADAL" clId="{D38472CA-A2F5-472B-9D5F-A440450DF1E1}" dt="2023-10-22T22:36:43.025" v="25" actId="1076"/>
+        <pc:sldMkLst>
+          <pc:docMk/>
+          <pc:sldMk cId="493331858" sldId="323"/>
+        </pc:sldMkLst>
+        <pc:picChg chg="add mod">
+          <ac:chgData name="Yoder, Jason" userId="28f4d4d8-da04-4f86-b14d-a21675737bc5" providerId="ADAL" clId="{D38472CA-A2F5-472B-9D5F-A440450DF1E1}" dt="2023-10-22T22:36:39.042" v="23" actId="1076"/>
+          <ac:picMkLst>
+            <pc:docMk/>
+            <pc:sldMk cId="493331858" sldId="323"/>
+            <ac:picMk id="4" creationId="{644ED54E-8F14-3C11-DA09-6B244005786B}"/>
+          </ac:picMkLst>
+        </pc:picChg>
+        <pc:picChg chg="del">
+          <ac:chgData name="Yoder, Jason" userId="28f4d4d8-da04-4f86-b14d-a21675737bc5" providerId="ADAL" clId="{D38472CA-A2F5-472B-9D5F-A440450DF1E1}" dt="2023-10-22T22:35:26.734" v="1" actId="478"/>
+          <ac:picMkLst>
+            <pc:docMk/>
+            <pc:sldMk cId="493331858" sldId="323"/>
+            <ac:picMk id="5" creationId="{EE192DCB-EF71-D384-8A85-348ADD759A71}"/>
+          </ac:picMkLst>
+        </pc:picChg>
+        <pc:picChg chg="del">
+          <ac:chgData name="Yoder, Jason" userId="28f4d4d8-da04-4f86-b14d-a21675737bc5" providerId="ADAL" clId="{D38472CA-A2F5-472B-9D5F-A440450DF1E1}" dt="2023-10-22T22:35:52.587" v="7" actId="478"/>
+          <ac:picMkLst>
+            <pc:docMk/>
+            <pc:sldMk cId="493331858" sldId="323"/>
+            <ac:picMk id="7" creationId="{35B73BA3-76EA-1951-8415-8F87135FB3C8}"/>
+          </ac:picMkLst>
+        </pc:picChg>
+        <pc:picChg chg="add mod">
+          <ac:chgData name="Yoder, Jason" userId="28f4d4d8-da04-4f86-b14d-a21675737bc5" providerId="ADAL" clId="{D38472CA-A2F5-472B-9D5F-A440450DF1E1}" dt="2023-10-22T22:36:41.410" v="24" actId="1076"/>
+          <ac:picMkLst>
+            <pc:docMk/>
+            <pc:sldMk cId="493331858" sldId="323"/>
+            <ac:picMk id="9" creationId="{4F6F6348-CD0E-237E-F72F-BB82EBC08F71}"/>
+          </ac:picMkLst>
+        </pc:picChg>
+        <pc:picChg chg="add mod">
+          <ac:chgData name="Yoder, Jason" userId="28f4d4d8-da04-4f86-b14d-a21675737bc5" providerId="ADAL" clId="{D38472CA-A2F5-472B-9D5F-A440450DF1E1}" dt="2023-10-22T22:36:43.025" v="25" actId="1076"/>
+          <ac:picMkLst>
+            <pc:docMk/>
+            <pc:sldMk cId="493331858" sldId="323"/>
+            <ac:picMk id="11" creationId="{85280E58-E9F1-76BA-3FDA-95B25F2F6720}"/>
+          </ac:picMkLst>
+        </pc:picChg>
+        <pc:picChg chg="add mod">
+          <ac:chgData name="Yoder, Jason" userId="28f4d4d8-da04-4f86-b14d-a21675737bc5" providerId="ADAL" clId="{D38472CA-A2F5-472B-9D5F-A440450DF1E1}" dt="2023-10-22T22:36:37.843" v="22" actId="1076"/>
+          <ac:picMkLst>
+            <pc:docMk/>
+            <pc:sldMk cId="493331858" sldId="323"/>
+            <ac:picMk id="13" creationId="{D809E6C0-2316-2136-5402-AF7584BD9D2F}"/>
+          </ac:picMkLst>
+        </pc:picChg>
+        <pc:inkChg chg="del">
+          <ac:chgData name="Yoder, Jason" userId="28f4d4d8-da04-4f86-b14d-a21675737bc5" providerId="ADAL" clId="{D38472CA-A2F5-472B-9D5F-A440450DF1E1}" dt="2023-10-22T22:35:25.298" v="0" actId="478"/>
+          <ac:inkMkLst>
+            <pc:docMk/>
+            <pc:sldMk cId="493331858" sldId="323"/>
+            <ac:inkMk id="8" creationId="{5B348A9E-3DC3-74F7-7B1F-9929D5EFC935}"/>
+          </ac:inkMkLst>
+        </pc:inkChg>
+      </pc:sldChg>
+    </pc:docChg>
+  </pc:docChgLst>
+</pc:chgInfo>
+</file>
+
 <file path=ppt/ink/ink1.xml><?xml version="1.0" encoding="utf-8"?>
 <inkml:ink xmlns:inkml="http://www.w3.org/2003/InkML">
   <inkml:definitions>
@@ -260,34 +337,6 @@
 </inkml:ink>
 </file>
 
-<file path=ppt/ink/ink5.xml><?xml version="1.0" encoding="utf-8"?>
-<inkml:ink xmlns:inkml="http://www.w3.org/2003/InkML">
-  <inkml:definitions>
-    <inkml:context xml:id="ctx0">
-      <inkml:inkSource xml:id="inkSrc0">
-        <inkml:traceFormat>
-          <inkml:channel name="X" type="integer" min="-2.14748E9" max="2.14748E9" units="cm"/>
-          <inkml:channel name="Y" type="integer" min="-2.14748E9" max="2.14748E9" units="cm"/>
-          <inkml:channel name="F" type="integer" max="32767" units="dev"/>
-        </inkml:traceFormat>
-        <inkml:channelProperties>
-          <inkml:channelProperty channel="X" name="resolution" value="1000" units="1/cm"/>
-          <inkml:channelProperty channel="Y" name="resolution" value="1000" units="1/cm"/>
-          <inkml:channelProperty channel="F" name="resolution" value="0" units="1/dev"/>
-        </inkml:channelProperties>
-      </inkml:inkSource>
-      <inkml:timestamp xml:id="ts0" timeString="2022-10-21T19:32:01.555"/>
-    </inkml:context>
-    <inkml:brush xml:id="br0">
-      <inkml:brushProperty name="width" value="0.05" units="cm"/>
-      <inkml:brushProperty name="height" value="0.05" units="cm"/>
-      <inkml:brushProperty name="color" value="#E71224"/>
-    </inkml:brush>
-  </inkml:definitions>
-  <inkml:trace contextRef="#ctx0" brushRef="#br0">4 4828 24575,'0'-1'0,"-1"0"0,1 0 0,-1 0 0,1 0 0,0 0 0,-1 0 0,1 0 0,0 0 0,-1 0 0,1 0 0,0 0 0,0 0 0,0 0 0,0 0 0,0 0 0,0 0 0,1 0 0,-1 0 0,0 0 0,0 0 0,1 0 0,-1 0 0,1 0 0,-1 0 0,0 0 0,1 0 0,0 0 0,-1 1 0,1-1 0,1-1 0,24-28 0,-23 27 0,48-42 0,1 3 0,3 1 0,1 4 0,70-36 0,94-63 0,463-317 0,-551 368 0,134-114 0,106-120 0,-233 196 0,393-293 0,-371 290 0,239-239 0,-298 248 0,-39 41 0,-37 49 0,37-28 0,-10 9 0,207-177 0,-98 88 0,128-91 0,-90 73 0,411-272 0,-221 165 0,-211 151 0,-120 76 0,-2-3 0,72-57 0,69-55 0,-196 147 0,0-1 0,0 1 0,0-1 0,-1 1 0,1-1 0,-1 0 0,1 0 0,-1 0 0,0 0 0,3-4 0,-4 6 0,0-1 0,0 1 0,0-1 0,0 1 0,0 0 0,0-1 0,0 1 0,0 0 0,0-1 0,0 1 0,-1-1 0,1 1 0,0 0 0,0-1 0,0 1 0,0 0 0,-1-1 0,1 1 0,0 0 0,0-1 0,-1 1 0,1 0 0,0 0 0,-1-1 0,1 1 0,0 0 0,0 0 0,-1-1 0,1 1 0,-1 0 0,1 0 0,0 0 0,-1 0 0,1 0 0,0 0 0,-1-1 0,-8 0 0,1 1 0,0-1 0,0 1 0,-14 2 0,11-2 0,-578 33 0,576-32 0,-7 1 0,0-1 0,-25-2 0,39-3 0,17-2 0,25-4 0,173-34 0,3 10 0,226-9 0,-427 42 0,1 0 0,0 1 0,0-1 0,0 2 0,0 0 0,22 4 0,-32-4 0,0-1 0,0 1 0,0 0 0,0 0 0,-1 0 0,1 0 0,0 0 0,0 1 0,-1-1 0,1 0 0,-1 1 0,1-1 0,-1 1 0,1-1 0,-1 1 0,0 0 0,0 0 0,0 0 0,0-1 0,0 1 0,0 0 0,-1 0 0,1 0 0,-1 0 0,1 0 0,-1 0 0,0 1 0,1-1 0,-1 0 0,0 0 0,-1 0 0,1 0 0,0 0 0,-1 0 0,1 0 0,-1 0 0,1 0 0,-1 0 0,-1 3 0,-47 118 0,0 2 0,15-12 0,-48 182 0,70-251-1365,7-25-5461</inkml:trace>
-</inkml:ink>
-</file>
-
 <file path=ppt/notesMasters/notesMaster1.xml><?xml version="1.0" encoding="utf-8"?>
 <p:notesMaster xmlns:a="http://schemas.openxmlformats.org/drawingml/2006/main" xmlns:r="http://schemas.openxmlformats.org/officeDocument/2006/relationships" xmlns:p="http://schemas.openxmlformats.org/presentationml/2006/main">
   <p:cSld>
@@ -370,7 +419,7 @@
           <a:p>
             <a:fld id="{28F7D565-3278-47FB-82CB-054B8DCFC962}" type="datetimeFigureOut">
               <a:rPr lang="en-US" smtClean="0"/>
-              <a:t>1/29/2023</a:t>
+              <a:t>10/22/2023</a:t>
             </a:fld>
             <a:endParaRPr lang="en-US"/>
           </a:p>
@@ -768,7 +817,7 @@
           <a:p>
             <a:fld id="{846CE7D5-CF57-46EF-B807-FDD0502418D4}" type="datetimeFigureOut">
               <a:rPr lang="en-US" smtClean="0"/>
-              <a:t>1/29/2023</a:t>
+              <a:t>10/22/2023</a:t>
             </a:fld>
             <a:endParaRPr lang="en-US"/>
           </a:p>
@@ -938,7 +987,7 @@
           <a:p>
             <a:fld id="{846CE7D5-CF57-46EF-B807-FDD0502418D4}" type="datetimeFigureOut">
               <a:rPr lang="en-US" smtClean="0"/>
-              <a:t>1/29/2023</a:t>
+              <a:t>10/22/2023</a:t>
             </a:fld>
             <a:endParaRPr lang="en-US"/>
           </a:p>
@@ -1118,7 +1167,7 @@
           <a:p>
             <a:fld id="{846CE7D5-CF57-46EF-B807-FDD0502418D4}" type="datetimeFigureOut">
               <a:rPr lang="en-US" smtClean="0"/>
-              <a:t>1/29/2023</a:t>
+              <a:t>10/22/2023</a:t>
             </a:fld>
             <a:endParaRPr lang="en-US"/>
           </a:p>
@@ -1288,7 +1337,7 @@
           <a:p>
             <a:fld id="{846CE7D5-CF57-46EF-B807-FDD0502418D4}" type="datetimeFigureOut">
               <a:rPr lang="en-US" smtClean="0"/>
-              <a:t>1/29/2023</a:t>
+              <a:t>10/22/2023</a:t>
             </a:fld>
             <a:endParaRPr lang="en-US"/>
           </a:p>
@@ -1534,7 +1583,7 @@
           <a:p>
             <a:fld id="{846CE7D5-CF57-46EF-B807-FDD0502418D4}" type="datetimeFigureOut">
               <a:rPr lang="en-US" smtClean="0"/>
-              <a:t>1/29/2023</a:t>
+              <a:t>10/22/2023</a:t>
             </a:fld>
             <a:endParaRPr lang="en-US"/>
           </a:p>
@@ -1766,7 +1815,7 @@
           <a:p>
             <a:fld id="{846CE7D5-CF57-46EF-B807-FDD0502418D4}" type="datetimeFigureOut">
               <a:rPr lang="en-US" smtClean="0"/>
-              <a:t>1/29/2023</a:t>
+              <a:t>10/22/2023</a:t>
             </a:fld>
             <a:endParaRPr lang="en-US"/>
           </a:p>
@@ -2133,7 +2182,7 @@
           <a:p>
             <a:fld id="{846CE7D5-CF57-46EF-B807-FDD0502418D4}" type="datetimeFigureOut">
               <a:rPr lang="en-US" smtClean="0"/>
-              <a:t>1/29/2023</a:t>
+              <a:t>10/22/2023</a:t>
             </a:fld>
             <a:endParaRPr lang="en-US"/>
           </a:p>
@@ -2251,7 +2300,7 @@
           <a:p>
             <a:fld id="{846CE7D5-CF57-46EF-B807-FDD0502418D4}" type="datetimeFigureOut">
               <a:rPr lang="en-US" smtClean="0"/>
-              <a:t>1/29/2023</a:t>
+              <a:t>10/22/2023</a:t>
             </a:fld>
             <a:endParaRPr lang="en-US"/>
           </a:p>
@@ -2346,7 +2395,7 @@
           <a:p>
             <a:fld id="{846CE7D5-CF57-46EF-B807-FDD0502418D4}" type="datetimeFigureOut">
               <a:rPr lang="en-US" smtClean="0"/>
-              <a:t>1/29/2023</a:t>
+              <a:t>10/22/2023</a:t>
             </a:fld>
             <a:endParaRPr lang="en-US"/>
           </a:p>
@@ -2623,7 +2672,7 @@
           <a:p>
             <a:fld id="{846CE7D5-CF57-46EF-B807-FDD0502418D4}" type="datetimeFigureOut">
               <a:rPr lang="en-US" smtClean="0"/>
-              <a:t>1/29/2023</a:t>
+              <a:t>10/22/2023</a:t>
             </a:fld>
             <a:endParaRPr lang="en-US"/>
           </a:p>
@@ -2880,7 +2929,7 @@
           <a:p>
             <a:fld id="{846CE7D5-CF57-46EF-B807-FDD0502418D4}" type="datetimeFigureOut">
               <a:rPr lang="en-US" smtClean="0"/>
-              <a:t>1/29/2023</a:t>
+              <a:t>10/22/2023</a:t>
             </a:fld>
             <a:endParaRPr lang="en-US"/>
           </a:p>
@@ -3093,7 +3142,7 @@
           <a:p>
             <a:fld id="{846CE7D5-CF57-46EF-B807-FDD0502418D4}" type="datetimeFigureOut">
               <a:rPr lang="en-US" smtClean="0"/>
-              <a:t>1/29/2023</a:t>
+              <a:t>10/22/2023</a:t>
             </a:fld>
             <a:endParaRPr lang="en-US"/>
           </a:p>
@@ -3860,10 +3909,10 @@
       </p:sp>
       <p:pic>
         <p:nvPicPr>
-          <p:cNvPr id="5" name="Picture 4">
+          <p:cNvPr id="4" name="Picture 3">
             <a:extLst>
               <a:ext uri="{FF2B5EF4-FFF2-40B4-BE49-F238E27FC236}">
-                <a16:creationId xmlns:a16="http://schemas.microsoft.com/office/drawing/2014/main" id="{EE192DCB-EF71-D384-8A85-348ADD759A71}"/>
+                <a16:creationId xmlns:a16="http://schemas.microsoft.com/office/drawing/2014/main" id="{644ED54E-8F14-3C11-DA09-6B244005786B}"/>
               </a:ext>
             </a:extLst>
           </p:cNvPr>
@@ -3880,8 +3929,8 @@
         </p:blipFill>
         <p:spPr>
           <a:xfrm>
-            <a:off x="391836" y="2161126"/>
-            <a:ext cx="9982200" cy="3676650"/>
+            <a:off x="4930980" y="1165363"/>
+            <a:ext cx="5862918" cy="1052931"/>
           </a:xfrm>
           <a:prstGeom prst="rect">
             <a:avLst/>
@@ -3890,10 +3939,10 @@
       </p:pic>
       <p:pic>
         <p:nvPicPr>
-          <p:cNvPr id="7" name="Picture 6">
+          <p:cNvPr id="9" name="Picture 8">
             <a:extLst>
               <a:ext uri="{FF2B5EF4-FFF2-40B4-BE49-F238E27FC236}">
-                <a16:creationId xmlns:a16="http://schemas.microsoft.com/office/drawing/2014/main" id="{35B73BA3-76EA-1951-8415-8F87135FB3C8}"/>
+                <a16:creationId xmlns:a16="http://schemas.microsoft.com/office/drawing/2014/main" id="{4F6F6348-CD0E-237E-F72F-BB82EBC08F71}"/>
               </a:ext>
             </a:extLst>
           </p:cNvPr>
@@ -3910,70 +3959,74 @@
         </p:blipFill>
         <p:spPr>
           <a:xfrm>
-            <a:off x="6708396" y="1623576"/>
-            <a:ext cx="5178804" cy="5084644"/>
+            <a:off x="94411" y="2490926"/>
+            <a:ext cx="6001588" cy="4163006"/>
           </a:xfrm>
           <a:prstGeom prst="rect">
             <a:avLst/>
           </a:prstGeom>
-          <a:ln>
-            <a:solidFill>
-              <a:schemeClr val="tx1"/>
-            </a:solidFill>
-          </a:ln>
         </p:spPr>
       </p:pic>
-      <mc:AlternateContent xmlns:mc="http://schemas.openxmlformats.org/markup-compatibility/2006" xmlns:p14="http://schemas.microsoft.com/office/powerpoint/2010/main">
-        <mc:Choice Requires="p14">
-          <p:contentPart p14:bwMode="auto" r:id="rId4">
-            <p14:nvContentPartPr>
-              <p14:cNvPr id="8" name="Ink 7">
-                <a:extLst>
-                  <a:ext uri="{FF2B5EF4-FFF2-40B4-BE49-F238E27FC236}">
-                    <a16:creationId xmlns:a16="http://schemas.microsoft.com/office/drawing/2014/main" id="{5B348A9E-3DC3-74F7-7B1F-9929D5EFC935}"/>
-                  </a:ext>
-                </a:extLst>
-              </p14:cNvPr>
-              <p14:cNvContentPartPr/>
-              <p14:nvPr/>
-            </p14:nvContentPartPr>
-            <p14:xfrm>
-              <a:off x="4545221" y="3194587"/>
-              <a:ext cx="2312640" cy="1738080"/>
-            </p14:xfrm>
-          </p:contentPart>
-        </mc:Choice>
-        <mc:Fallback xmlns="">
-          <p:pic>
-            <p:nvPicPr>
-              <p:cNvPr id="8" name="Ink 7">
-                <a:extLst>
-                  <a:ext uri="{FF2B5EF4-FFF2-40B4-BE49-F238E27FC236}">
-                    <a16:creationId xmlns:a16="http://schemas.microsoft.com/office/drawing/2014/main" id="{5B348A9E-3DC3-74F7-7B1F-9929D5EFC935}"/>
-                  </a:ext>
-                </a:extLst>
-              </p:cNvPr>
-              <p:cNvPicPr/>
-              <p:nvPr/>
-            </p:nvPicPr>
-            <p:blipFill>
-              <a:blip r:embed="rId5"/>
-              <a:stretch>
-                <a:fillRect/>
-              </a:stretch>
-            </p:blipFill>
-            <p:spPr>
-              <a:xfrm>
-                <a:off x="4536221" y="3185587"/>
-                <a:ext cx="2330280" cy="1755720"/>
-              </a:xfrm>
-              <a:prstGeom prst="rect">
-                <a:avLst/>
-              </a:prstGeom>
-            </p:spPr>
-          </p:pic>
-        </mc:Fallback>
-      </mc:AlternateContent>
+      <p:pic>
+        <p:nvPicPr>
+          <p:cNvPr id="11" name="Picture 10">
+            <a:extLst>
+              <a:ext uri="{FF2B5EF4-FFF2-40B4-BE49-F238E27FC236}">
+                <a16:creationId xmlns:a16="http://schemas.microsoft.com/office/drawing/2014/main" id="{85280E58-E9F1-76BA-3FDA-95B25F2F6720}"/>
+              </a:ext>
+            </a:extLst>
+          </p:cNvPr>
+          <p:cNvPicPr>
+            <a:picLocks noChangeAspect="1"/>
+          </p:cNvPicPr>
+          <p:nvPr/>
+        </p:nvPicPr>
+        <p:blipFill>
+          <a:blip r:embed="rId4"/>
+          <a:stretch>
+            <a:fillRect/>
+          </a:stretch>
+        </p:blipFill>
+        <p:spPr>
+          <a:xfrm>
+            <a:off x="6191265" y="2490926"/>
+            <a:ext cx="5906324" cy="3543795"/>
+          </a:xfrm>
+          <a:prstGeom prst="rect">
+            <a:avLst/>
+          </a:prstGeom>
+        </p:spPr>
+      </p:pic>
+      <p:pic>
+        <p:nvPicPr>
+          <p:cNvPr id="13" name="Picture 12">
+            <a:extLst>
+              <a:ext uri="{FF2B5EF4-FFF2-40B4-BE49-F238E27FC236}">
+                <a16:creationId xmlns:a16="http://schemas.microsoft.com/office/drawing/2014/main" id="{D809E6C0-2316-2136-5402-AF7584BD9D2F}"/>
+              </a:ext>
+            </a:extLst>
+          </p:cNvPr>
+          <p:cNvPicPr>
+            <a:picLocks noChangeAspect="1"/>
+          </p:cNvPicPr>
+          <p:nvPr/>
+        </p:nvPicPr>
+        <p:blipFill>
+          <a:blip r:embed="rId5"/>
+          <a:stretch>
+            <a:fillRect/>
+          </a:stretch>
+        </p:blipFill>
+        <p:spPr>
+          <a:xfrm>
+            <a:off x="1633102" y="1043118"/>
+            <a:ext cx="2696461" cy="1198428"/>
+          </a:xfrm>
+          <a:prstGeom prst="rect">
+            <a:avLst/>
+          </a:prstGeom>
+        </p:spPr>
+      </p:pic>
     </p:spTree>
     <p:extLst>
       <p:ext uri="{BB962C8B-B14F-4D97-AF65-F5344CB8AC3E}">

</xml_diff>